<commit_message>
update zwischenpresentation with x and y data and slide numbers
</commit_message>
<xml_diff>
--- a/Präsentation/pspohr - SLIFI Zwischenpräsentation 09Jan2024.pptx
+++ b/Präsentation/pspohr - SLIFI Zwischenpräsentation 09Jan2024.pptx
@@ -5,10 +5,10 @@
     <p:sldMasterId id="2147483648" r:id="rId4"/>
   </p:sldMasterIdLst>
   <p:notesMasterIdLst>
-    <p:notesMasterId r:id="rId26"/>
+    <p:notesMasterId r:id="rId27"/>
   </p:notesMasterIdLst>
   <p:handoutMasterIdLst>
-    <p:handoutMasterId r:id="rId27"/>
+    <p:handoutMasterId r:id="rId28"/>
   </p:handoutMasterIdLst>
   <p:sldIdLst>
     <p:sldId id="256" r:id="rId5"/>
@@ -28,10 +28,11 @@
     <p:sldId id="275" r:id="rId19"/>
     <p:sldId id="282" r:id="rId20"/>
     <p:sldId id="279" r:id="rId21"/>
-    <p:sldId id="276" r:id="rId22"/>
-    <p:sldId id="269" r:id="rId23"/>
-    <p:sldId id="266" r:id="rId24"/>
-    <p:sldId id="271" r:id="rId25"/>
+    <p:sldId id="284" r:id="rId22"/>
+    <p:sldId id="276" r:id="rId23"/>
+    <p:sldId id="269" r:id="rId24"/>
+    <p:sldId id="266" r:id="rId25"/>
+    <p:sldId id="271" r:id="rId26"/>
   </p:sldIdLst>
   <p:sldSz cx="12192000" cy="6858000"/>
   <p:notesSz cx="6858000" cy="9144000"/>
@@ -144,6 +145,7 @@
 <file path=ppt/revisionInfo.xml><?xml version="1.0" encoding="utf-8"?>
 <p1510:revInfo xmlns:a="http://schemas.openxmlformats.org/drawingml/2006/main" xmlns:r="http://schemas.openxmlformats.org/officeDocument/2006/relationships" xmlns:p1510="http://schemas.microsoft.com/office/powerpoint/2015/10/main">
   <p1510:revLst>
+    <p1510:client id="{6151AC62-3526-4785-8DE7-A8101ABC310B}" v="2" dt="2024-01-09T07:38:07.640"/>
     <p1510:client id="{DF9858F3-AC30-49A1-8942-DBB4D65E35D1}" v="40" dt="2024-01-08T19:02:18.735"/>
   </p1510:revLst>
 </p1510:revInfo>
@@ -1947,6 +1949,132 @@
             <pc:docMk/>
             <pc:sldMk cId="4229088505" sldId="283"/>
             <ac:picMk id="13" creationId="{138F2525-7CB4-1D61-FE33-F6B454A79E74}"/>
+          </ac:picMkLst>
+        </pc:picChg>
+      </pc:sldChg>
+    </pc:docChg>
+  </pc:docChgLst>
+  <pc:docChgLst>
+    <pc:chgData name="Patrick Spohr" userId="52d4397b1069a9aa" providerId="LiveId" clId="{6151AC62-3526-4785-8DE7-A8101ABC310B}"/>
+    <pc:docChg chg="custSel addSld modSld">
+      <pc:chgData name="Patrick Spohr" userId="52d4397b1069a9aa" providerId="LiveId" clId="{6151AC62-3526-4785-8DE7-A8101ABC310B}" dt="2024-01-09T07:40:38.812" v="199" actId="20577"/>
+      <pc:docMkLst>
+        <pc:docMk/>
+      </pc:docMkLst>
+      <pc:sldChg chg="modSp mod">
+        <pc:chgData name="Patrick Spohr" userId="52d4397b1069a9aa" providerId="LiveId" clId="{6151AC62-3526-4785-8DE7-A8101ABC310B}" dt="2024-01-09T07:40:38.812" v="199" actId="20577"/>
+        <pc:sldMkLst>
+          <pc:docMk/>
+          <pc:sldMk cId="1713219598" sldId="257"/>
+        </pc:sldMkLst>
+        <pc:spChg chg="mod">
+          <ac:chgData name="Patrick Spohr" userId="52d4397b1069a9aa" providerId="LiveId" clId="{6151AC62-3526-4785-8DE7-A8101ABC310B}" dt="2024-01-09T07:40:38.812" v="199" actId="20577"/>
+          <ac:spMkLst>
+            <pc:docMk/>
+            <pc:sldMk cId="1713219598" sldId="257"/>
+            <ac:spMk id="3" creationId="{5671D7E5-EF66-4BCD-8DAA-E9061157F0BE}"/>
+          </ac:spMkLst>
+        </pc:spChg>
+      </pc:sldChg>
+      <pc:sldChg chg="modSp mod">
+        <pc:chgData name="Patrick Spohr" userId="52d4397b1069a9aa" providerId="LiveId" clId="{6151AC62-3526-4785-8DE7-A8101ABC310B}" dt="2024-01-09T07:33:05.968" v="137" actId="20577"/>
+        <pc:sldMkLst>
+          <pc:docMk/>
+          <pc:sldMk cId="2499682613" sldId="269"/>
+        </pc:sldMkLst>
+        <pc:spChg chg="mod">
+          <ac:chgData name="Patrick Spohr" userId="52d4397b1069a9aa" providerId="LiveId" clId="{6151AC62-3526-4785-8DE7-A8101ABC310B}" dt="2024-01-09T07:33:05.968" v="137" actId="20577"/>
+          <ac:spMkLst>
+            <pc:docMk/>
+            <pc:sldMk cId="2499682613" sldId="269"/>
+            <ac:spMk id="14" creationId="{161C3FFD-72F4-FAB7-C7A1-EED5B0D45B3A}"/>
+          </ac:spMkLst>
+        </pc:spChg>
+      </pc:sldChg>
+      <pc:sldChg chg="addSp delSp modSp add mod">
+        <pc:chgData name="Patrick Spohr" userId="52d4397b1069a9aa" providerId="LiveId" clId="{6151AC62-3526-4785-8DE7-A8101ABC310B}" dt="2024-01-09T07:28:11.588" v="136" actId="1076"/>
+        <pc:sldMkLst>
+          <pc:docMk/>
+          <pc:sldMk cId="675902136" sldId="284"/>
+        </pc:sldMkLst>
+        <pc:spChg chg="mod">
+          <ac:chgData name="Patrick Spohr" userId="52d4397b1069a9aa" providerId="LiveId" clId="{6151AC62-3526-4785-8DE7-A8101ABC310B}" dt="2024-01-09T07:28:00.076" v="130" actId="1076"/>
+          <ac:spMkLst>
+            <pc:docMk/>
+            <pc:sldMk cId="675902136" sldId="284"/>
+            <ac:spMk id="3" creationId="{D851C395-6BC4-4F00-B40B-069DBBB7C08B}"/>
+          </ac:spMkLst>
+        </pc:spChg>
+        <pc:spChg chg="mod">
+          <ac:chgData name="Patrick Spohr" userId="52d4397b1069a9aa" providerId="LiveId" clId="{6151AC62-3526-4785-8DE7-A8101ABC310B}" dt="2024-01-09T07:28:03.168" v="131" actId="14100"/>
+          <ac:spMkLst>
+            <pc:docMk/>
+            <pc:sldMk cId="675902136" sldId="284"/>
+            <ac:spMk id="4" creationId="{A1D16151-9486-4A03-AE3A-F1CC562E0564}"/>
+          </ac:spMkLst>
+        </pc:spChg>
+        <pc:spChg chg="mod">
+          <ac:chgData name="Patrick Spohr" userId="52d4397b1069a9aa" providerId="LiveId" clId="{6151AC62-3526-4785-8DE7-A8101ABC310B}" dt="2024-01-09T07:28:00.076" v="130" actId="1076"/>
+          <ac:spMkLst>
+            <pc:docMk/>
+            <pc:sldMk cId="675902136" sldId="284"/>
+            <ac:spMk id="5" creationId="{DDE59236-37DD-4582-A2A0-3F9A13A3B55D}"/>
+          </ac:spMkLst>
+        </pc:spChg>
+        <pc:spChg chg="mod">
+          <ac:chgData name="Patrick Spohr" userId="52d4397b1069a9aa" providerId="LiveId" clId="{6151AC62-3526-4785-8DE7-A8101ABC310B}" dt="2024-01-09T07:28:03.168" v="131" actId="14100"/>
+          <ac:spMkLst>
+            <pc:docMk/>
+            <pc:sldMk cId="675902136" sldId="284"/>
+            <ac:spMk id="6" creationId="{DE1CCF0F-F0BB-42D7-B3C2-C29336739F32}"/>
+          </ac:spMkLst>
+        </pc:spChg>
+        <pc:spChg chg="del">
+          <ac:chgData name="Patrick Spohr" userId="52d4397b1069a9aa" providerId="LiveId" clId="{6151AC62-3526-4785-8DE7-A8101ABC310B}" dt="2024-01-09T07:22:48.761" v="25" actId="478"/>
+          <ac:spMkLst>
+            <pc:docMk/>
+            <pc:sldMk cId="675902136" sldId="284"/>
+            <ac:spMk id="7" creationId="{1F939793-2181-4A3D-9C5A-CE676CC83EC0}"/>
+          </ac:spMkLst>
+        </pc:spChg>
+        <pc:spChg chg="del">
+          <ac:chgData name="Patrick Spohr" userId="52d4397b1069a9aa" providerId="LiveId" clId="{6151AC62-3526-4785-8DE7-A8101ABC310B}" dt="2024-01-09T07:22:49.907" v="26" actId="478"/>
+          <ac:spMkLst>
+            <pc:docMk/>
+            <pc:sldMk cId="675902136" sldId="284"/>
+            <ac:spMk id="8" creationId="{C9FA0B0D-7B36-4D63-86BD-20E6E1B6A0D8}"/>
+          </ac:spMkLst>
+        </pc:spChg>
+        <pc:spChg chg="del">
+          <ac:chgData name="Patrick Spohr" userId="52d4397b1069a9aa" providerId="LiveId" clId="{6151AC62-3526-4785-8DE7-A8101ABC310B}" dt="2024-01-09T07:23:15.726" v="31" actId="478"/>
+          <ac:spMkLst>
+            <pc:docMk/>
+            <pc:sldMk cId="675902136" sldId="284"/>
+            <ac:spMk id="9" creationId="{A2EC940A-65AF-FBBA-3E19-2972579674C8}"/>
+          </ac:spMkLst>
+        </pc:spChg>
+        <pc:spChg chg="add del mod">
+          <ac:chgData name="Patrick Spohr" userId="52d4397b1069a9aa" providerId="LiveId" clId="{6151AC62-3526-4785-8DE7-A8101ABC310B}" dt="2024-01-09T07:22:52.973" v="27" actId="478"/>
+          <ac:spMkLst>
+            <pc:docMk/>
+            <pc:sldMk cId="675902136" sldId="284"/>
+            <ac:spMk id="11" creationId="{F5764024-B029-5475-D1D5-5CCD3B490D63}"/>
+          </ac:spMkLst>
+        </pc:spChg>
+        <pc:spChg chg="add del mod">
+          <ac:chgData name="Patrick Spohr" userId="52d4397b1069a9aa" providerId="LiveId" clId="{6151AC62-3526-4785-8DE7-A8101ABC310B}" dt="2024-01-09T07:22:52.973" v="27" actId="478"/>
+          <ac:spMkLst>
+            <pc:docMk/>
+            <pc:sldMk cId="675902136" sldId="284"/>
+            <ac:spMk id="13" creationId="{10A767C8-7654-1223-9D6D-D7F5BA8E4E48}"/>
+          </ac:spMkLst>
+        </pc:spChg>
+        <pc:picChg chg="add mod">
+          <ac:chgData name="Patrick Spohr" userId="52d4397b1069a9aa" providerId="LiveId" clId="{6151AC62-3526-4785-8DE7-A8101ABC310B}" dt="2024-01-09T07:28:11.588" v="136" actId="1076"/>
+          <ac:picMkLst>
+            <pc:docMk/>
+            <pc:sldMk cId="675902136" sldId="284"/>
+            <ac:picMk id="15" creationId="{12660E55-FB12-693F-EC4B-7ABF95E38E8B}"/>
           </ac:picMkLst>
         </pc:picChg>
       </pc:sldChg>
@@ -2049,7 +2177,7 @@
           <a:p>
             <a:fld id="{B56F32FC-4BD9-442A-A8C6-51598C909FE3}" type="datetimeFigureOut">
               <a:rPr lang="en-US" smtClean="0"/>
-              <a:t>1/8/2024</a:t>
+              <a:t>1/9/2024</a:t>
             </a:fld>
             <a:endParaRPr lang="en-US" dirty="0"/>
           </a:p>
@@ -2226,7 +2354,7 @@
           <a:p>
             <a:fld id="{056371FA-A98D-41E8-93F4-09945841298A}" type="datetimeFigureOut">
               <a:rPr lang="en-US" smtClean="0"/>
-              <a:t>1/8/2024</a:t>
+              <a:t>1/9/2024</a:t>
             </a:fld>
             <a:endParaRPr lang="en-US" dirty="0"/>
           </a:p>
@@ -2902,10 +3030,7 @@
             </a:lvl1pPr>
           </a:lstStyle>
           <a:p>
-            <a:r>
-              <a:rPr lang="en-US" dirty="0"/>
-              <a:t>20XX</a:t>
-            </a:r>
+            <a:endParaRPr lang="en-US" dirty="0"/>
           </a:p>
         </p:txBody>
       </p:sp>
@@ -2934,10 +3059,7 @@
             </a:lvl1pPr>
           </a:lstStyle>
           <a:p>
-            <a:r>
-              <a:rPr lang="en-US" dirty="0"/>
-              <a:t>PRESENTATION TITLE</a:t>
-            </a:r>
+            <a:endParaRPr lang="en-US" dirty="0"/>
           </a:p>
         </p:txBody>
       </p:sp>
@@ -3503,10 +3625,7 @@
             </a:lvl1pPr>
           </a:lstStyle>
           <a:p>
-            <a:r>
-              <a:rPr lang="en-US" dirty="0"/>
-              <a:t>20XX</a:t>
-            </a:r>
+            <a:endParaRPr lang="en-US" dirty="0"/>
           </a:p>
         </p:txBody>
       </p:sp>
@@ -3540,10 +3659,7 @@
             </a:lvl1pPr>
           </a:lstStyle>
           <a:p>
-            <a:r>
-              <a:rPr lang="en-US" dirty="0"/>
-              <a:t>PRESENTATION TITLE</a:t>
-            </a:r>
+            <a:endParaRPr lang="en-US" dirty="0"/>
           </a:p>
         </p:txBody>
       </p:sp>
@@ -4248,10 +4364,7 @@
             </a:lvl1pPr>
           </a:lstStyle>
           <a:p>
-            <a:r>
-              <a:rPr lang="en-US" dirty="0"/>
-              <a:t>20XX</a:t>
-            </a:r>
+            <a:endParaRPr lang="en-US" dirty="0"/>
           </a:p>
         </p:txBody>
       </p:sp>
@@ -4280,10 +4393,7 @@
             </a:lvl1pPr>
           </a:lstStyle>
           <a:p>
-            <a:r>
-              <a:rPr lang="en-US" dirty="0"/>
-              <a:t>PRESENTATION TITLE</a:t>
-            </a:r>
+            <a:endParaRPr lang="en-US" dirty="0"/>
           </a:p>
         </p:txBody>
       </p:sp>
@@ -5012,10 +5122,7 @@
             </a:lvl1pPr>
           </a:lstStyle>
           <a:p>
-            <a:r>
-              <a:rPr lang="en-US" dirty="0"/>
-              <a:t>20XX</a:t>
-            </a:r>
+            <a:endParaRPr lang="en-US" dirty="0"/>
           </a:p>
         </p:txBody>
       </p:sp>
@@ -5044,10 +5151,7 @@
             </a:lvl1pPr>
           </a:lstStyle>
           <a:p>
-            <a:r>
-              <a:rPr lang="en-US" dirty="0"/>
-              <a:t>PRESENTATION TITLE</a:t>
-            </a:r>
+            <a:endParaRPr lang="en-US" dirty="0"/>
           </a:p>
         </p:txBody>
       </p:sp>
@@ -5536,10 +5640,7 @@
             </a:lvl1pPr>
           </a:lstStyle>
           <a:p>
-            <a:r>
-              <a:rPr lang="en-US" dirty="0"/>
-              <a:t>20XX</a:t>
-            </a:r>
+            <a:endParaRPr lang="en-US" dirty="0"/>
           </a:p>
         </p:txBody>
       </p:sp>
@@ -5573,10 +5674,7 @@
             </a:lvl1pPr>
           </a:lstStyle>
           <a:p>
-            <a:r>
-              <a:rPr lang="en-US" dirty="0"/>
-              <a:t>PRESENTATION TITLE</a:t>
-            </a:r>
+            <a:endParaRPr lang="en-US" dirty="0"/>
           </a:p>
         </p:txBody>
       </p:sp>
@@ -5856,10 +5954,7 @@
             </a:lvl1pPr>
           </a:lstStyle>
           <a:p>
-            <a:r>
-              <a:rPr lang="en-US" dirty="0"/>
-              <a:t>20XX</a:t>
-            </a:r>
+            <a:endParaRPr lang="en-US" dirty="0"/>
           </a:p>
         </p:txBody>
       </p:sp>
@@ -5893,10 +5988,7 @@
             </a:lvl1pPr>
           </a:lstStyle>
           <a:p>
-            <a:r>
-              <a:rPr lang="en-US" dirty="0"/>
-              <a:t>PRESENTATION TITLE</a:t>
-            </a:r>
+            <a:endParaRPr lang="en-US" dirty="0"/>
           </a:p>
         </p:txBody>
       </p:sp>
@@ -6205,10 +6297,7 @@
             </a:lvl1pPr>
           </a:lstStyle>
           <a:p>
-            <a:r>
-              <a:rPr lang="en-US" dirty="0"/>
-              <a:t>20XX</a:t>
-            </a:r>
+            <a:endParaRPr lang="en-US" dirty="0"/>
           </a:p>
         </p:txBody>
       </p:sp>
@@ -6242,10 +6331,7 @@
             </a:lvl1pPr>
           </a:lstStyle>
           <a:p>
-            <a:r>
-              <a:rPr lang="en-US" dirty="0"/>
-              <a:t>PRESENTATION TITLE</a:t>
-            </a:r>
+            <a:endParaRPr lang="en-US" dirty="0"/>
           </a:p>
         </p:txBody>
       </p:sp>
@@ -6522,10 +6608,7 @@
             </a:lvl1pPr>
           </a:lstStyle>
           <a:p>
-            <a:r>
-              <a:rPr lang="en-US" dirty="0"/>
-              <a:t>20XX</a:t>
-            </a:r>
+            <a:endParaRPr lang="en-US" dirty="0"/>
           </a:p>
         </p:txBody>
       </p:sp>
@@ -6559,10 +6642,7 @@
             </a:lvl1pPr>
           </a:lstStyle>
           <a:p>
-            <a:r>
-              <a:rPr lang="en-US" dirty="0"/>
-              <a:t>PRESENTATION TITLE</a:t>
-            </a:r>
+            <a:endParaRPr lang="en-US" dirty="0"/>
           </a:p>
         </p:txBody>
       </p:sp>
@@ -7000,10 +7080,7 @@
             </a:lvl1pPr>
           </a:lstStyle>
           <a:p>
-            <a:r>
-              <a:rPr lang="en-US" dirty="0"/>
-              <a:t>20XX</a:t>
-            </a:r>
+            <a:endParaRPr lang="en-US" dirty="0"/>
           </a:p>
         </p:txBody>
       </p:sp>
@@ -7032,10 +7109,7 @@
             </a:lvl1pPr>
           </a:lstStyle>
           <a:p>
-            <a:r>
-              <a:rPr lang="en-US" dirty="0"/>
-              <a:t>PRESENTATION TITLE</a:t>
-            </a:r>
+            <a:endParaRPr lang="en-US" dirty="0"/>
           </a:p>
         </p:txBody>
       </p:sp>
@@ -7242,10 +7316,7 @@
             </a:lvl1pPr>
           </a:lstStyle>
           <a:p>
-            <a:r>
-              <a:rPr lang="en-US" dirty="0"/>
-              <a:t>20XX</a:t>
-            </a:r>
+            <a:endParaRPr lang="en-US" dirty="0"/>
           </a:p>
         </p:txBody>
       </p:sp>
@@ -7274,10 +7345,7 @@
             </a:lvl1pPr>
           </a:lstStyle>
           <a:p>
-            <a:r>
-              <a:rPr lang="en-US" dirty="0"/>
-              <a:t>PRESENTATION TITLE</a:t>
-            </a:r>
+            <a:endParaRPr lang="en-US" dirty="0"/>
           </a:p>
         </p:txBody>
       </p:sp>
@@ -7538,10 +7606,7 @@
             </a:lvl1pPr>
           </a:lstStyle>
           <a:p>
-            <a:r>
-              <a:rPr lang="en-US" dirty="0"/>
-              <a:t>20XX</a:t>
-            </a:r>
+            <a:endParaRPr lang="en-US" dirty="0"/>
           </a:p>
         </p:txBody>
       </p:sp>
@@ -7575,10 +7640,7 @@
             </a:lvl1pPr>
           </a:lstStyle>
           <a:p>
-            <a:r>
-              <a:rPr lang="en-US" dirty="0"/>
-              <a:t>PRESENTATION TITLE</a:t>
-            </a:r>
+            <a:endParaRPr lang="en-US" dirty="0"/>
           </a:p>
         </p:txBody>
       </p:sp>
@@ -8568,10 +8630,7 @@
             </a:lvl1pPr>
           </a:lstStyle>
           <a:p>
-            <a:r>
-              <a:rPr lang="en-US" dirty="0"/>
-              <a:t>20XX</a:t>
-            </a:r>
+            <a:endParaRPr lang="en-US" dirty="0"/>
           </a:p>
         </p:txBody>
       </p:sp>
@@ -8600,10 +8659,7 @@
             </a:lvl1pPr>
           </a:lstStyle>
           <a:p>
-            <a:r>
-              <a:rPr lang="en-US" dirty="0"/>
-              <a:t>PRESENTATION TITLE</a:t>
-            </a:r>
+            <a:endParaRPr lang="en-US" dirty="0"/>
           </a:p>
         </p:txBody>
       </p:sp>
@@ -10647,10 +10703,7 @@
             </a:lvl1pPr>
           </a:lstStyle>
           <a:p>
-            <a:r>
-              <a:rPr lang="en-US" dirty="0"/>
-              <a:t>20XX</a:t>
-            </a:r>
+            <a:endParaRPr lang="en-US" dirty="0"/>
           </a:p>
         </p:txBody>
       </p:sp>
@@ -10683,10 +10736,7 @@
             </a:lvl1pPr>
           </a:lstStyle>
           <a:p>
-            <a:r>
-              <a:rPr lang="en-US" dirty="0"/>
-              <a:t>PRESENTATION TITLE</a:t>
-            </a:r>
+            <a:endParaRPr lang="en-US" dirty="0"/>
           </a:p>
         </p:txBody>
       </p:sp>
@@ -10907,10 +10957,7 @@
             </a:lvl1pPr>
           </a:lstStyle>
           <a:p>
-            <a:r>
-              <a:rPr lang="en-US" dirty="0"/>
-              <a:t>20XX</a:t>
-            </a:r>
+            <a:endParaRPr lang="en-US" dirty="0"/>
           </a:p>
         </p:txBody>
       </p:sp>
@@ -10953,10 +11000,7 @@
             </a:lvl1pPr>
           </a:lstStyle>
           <a:p>
-            <a:r>
-              <a:rPr lang="en-US" dirty="0"/>
-              <a:t>PRESENTATION TITLE</a:t>
-            </a:r>
+            <a:endParaRPr lang="en-US" dirty="0"/>
           </a:p>
         </p:txBody>
       </p:sp>
@@ -11032,7 +11076,7 @@
     <p:sldLayoutId id="2147483664" r:id="rId14"/>
     <p:sldLayoutId id="2147483665" r:id="rId15"/>
   </p:sldLayoutIdLst>
-  <p:hf hdr="0" dt="0"/>
+  <p:hf hdr="0" ftr="0" dt="0"/>
   <p:txStyles>
     <p:titleStyle>
       <a:lvl1pPr algn="l" defTabSz="914400" rtl="0" eaLnBrk="1" latinLnBrk="0" hangingPunct="1">
@@ -11811,6 +11855,36 @@
           </a:p>
         </p:txBody>
       </p:sp>
+      <p:sp>
+        <p:nvSpPr>
+          <p:cNvPr id="7" name="Slide Number Placeholder 6">
+            <a:extLst>
+              <a:ext uri="{FF2B5EF4-FFF2-40B4-BE49-F238E27FC236}">
+                <a16:creationId xmlns:a16="http://schemas.microsoft.com/office/drawing/2014/main" id="{ADD7320E-42B6-6B67-8681-69B7102734CA}"/>
+              </a:ext>
+            </a:extLst>
+          </p:cNvPr>
+          <p:cNvSpPr>
+            <a:spLocks noGrp="1"/>
+          </p:cNvSpPr>
+          <p:nvPr>
+            <p:ph type="sldNum" sz="quarter" idx="12"/>
+          </p:nvPr>
+        </p:nvSpPr>
+        <p:spPr/>
+        <p:txBody>
+          <a:bodyPr/>
+          <a:lstStyle/>
+          <a:p>
+            <a:fld id="{A49DFD55-3C28-40EF-9E31-A92D2E4017FF}" type="slidenum">
+              <a:rPr lang="en-US" smtClean="0"/>
+              <a:pPr/>
+              <a:t>11</a:t>
+            </a:fld>
+            <a:endParaRPr lang="en-US" dirty="0"/>
+          </a:p>
+        </p:txBody>
+      </p:sp>
     </p:spTree>
     <p:extLst>
       <p:ext uri="{BB962C8B-B14F-4D97-AF65-F5344CB8AC3E}">
@@ -11957,6 +12031,36 @@
           </a:p>
         </p:txBody>
       </p:sp>
+      <p:sp>
+        <p:nvSpPr>
+          <p:cNvPr id="3" name="Slide Number Placeholder 2">
+            <a:extLst>
+              <a:ext uri="{FF2B5EF4-FFF2-40B4-BE49-F238E27FC236}">
+                <a16:creationId xmlns:a16="http://schemas.microsoft.com/office/drawing/2014/main" id="{01DB9FBE-E72D-094F-58DE-89192BAAE4CF}"/>
+              </a:ext>
+            </a:extLst>
+          </p:cNvPr>
+          <p:cNvSpPr>
+            <a:spLocks noGrp="1"/>
+          </p:cNvSpPr>
+          <p:nvPr>
+            <p:ph type="sldNum" sz="quarter" idx="12"/>
+          </p:nvPr>
+        </p:nvSpPr>
+        <p:spPr/>
+        <p:txBody>
+          <a:bodyPr/>
+          <a:lstStyle/>
+          <a:p>
+            <a:fld id="{A49DFD55-3C28-40EF-9E31-A92D2E4017FF}" type="slidenum">
+              <a:rPr lang="en-US" smtClean="0"/>
+              <a:pPr/>
+              <a:t>12</a:t>
+            </a:fld>
+            <a:endParaRPr lang="en-US" dirty="0"/>
+          </a:p>
+        </p:txBody>
+      </p:sp>
     </p:spTree>
     <p:extLst>
       <p:ext uri="{BB962C8B-B14F-4D97-AF65-F5344CB8AC3E}">
@@ -12334,6 +12438,36 @@
           </a:p>
         </p:txBody>
       </p:sp>
+      <p:sp>
+        <p:nvSpPr>
+          <p:cNvPr id="3" name="Slide Number Placeholder 2">
+            <a:extLst>
+              <a:ext uri="{FF2B5EF4-FFF2-40B4-BE49-F238E27FC236}">
+                <a16:creationId xmlns:a16="http://schemas.microsoft.com/office/drawing/2014/main" id="{36CDB00D-712A-AA09-0B43-D3DCB89F0EB9}"/>
+              </a:ext>
+            </a:extLst>
+          </p:cNvPr>
+          <p:cNvSpPr>
+            <a:spLocks noGrp="1"/>
+          </p:cNvSpPr>
+          <p:nvPr>
+            <p:ph type="sldNum" sz="quarter" idx="12"/>
+          </p:nvPr>
+        </p:nvSpPr>
+        <p:spPr/>
+        <p:txBody>
+          <a:bodyPr/>
+          <a:lstStyle/>
+          <a:p>
+            <a:fld id="{A49DFD55-3C28-40EF-9E31-A92D2E4017FF}" type="slidenum">
+              <a:rPr lang="en-US" smtClean="0"/>
+              <a:pPr/>
+              <a:t>14</a:t>
+            </a:fld>
+            <a:endParaRPr lang="en-US" dirty="0"/>
+          </a:p>
+        </p:txBody>
+      </p:sp>
     </p:spTree>
     <p:extLst>
       <p:ext uri="{BB962C8B-B14F-4D97-AF65-F5344CB8AC3E}">
@@ -12703,6 +12837,36 @@
               </a:rPr>
               <a:t>Schnell und reibungslos Wertpapier in einem Portfolio zuteilen mit Hilfe ein KNN</a:t>
             </a:r>
+          </a:p>
+        </p:txBody>
+      </p:sp>
+      <p:sp>
+        <p:nvSpPr>
+          <p:cNvPr id="10" name="Slide Number Placeholder 9">
+            <a:extLst>
+              <a:ext uri="{FF2B5EF4-FFF2-40B4-BE49-F238E27FC236}">
+                <a16:creationId xmlns:a16="http://schemas.microsoft.com/office/drawing/2014/main" id="{3001883A-F5A2-5B3B-606B-F4C227CB1429}"/>
+              </a:ext>
+            </a:extLst>
+          </p:cNvPr>
+          <p:cNvSpPr>
+            <a:spLocks noGrp="1"/>
+          </p:cNvSpPr>
+          <p:nvPr>
+            <p:ph type="sldNum" sz="quarter" idx="12"/>
+          </p:nvPr>
+        </p:nvSpPr>
+        <p:spPr/>
+        <p:txBody>
+          <a:bodyPr/>
+          <a:lstStyle/>
+          <a:p>
+            <a:fld id="{A49DFD55-3C28-40EF-9E31-A92D2E4017FF}" type="slidenum">
+              <a:rPr lang="en-US" smtClean="0"/>
+              <a:pPr/>
+              <a:t>16</a:t>
+            </a:fld>
+            <a:endParaRPr lang="en-US" dirty="0"/>
           </a:p>
         </p:txBody>
       </p:sp>
@@ -13119,6 +13283,36 @@
           </a:p>
         </p:txBody>
       </p:sp>
+      <p:sp>
+        <p:nvSpPr>
+          <p:cNvPr id="3" name="Slide Number Placeholder 2">
+            <a:extLst>
+              <a:ext uri="{FF2B5EF4-FFF2-40B4-BE49-F238E27FC236}">
+                <a16:creationId xmlns:a16="http://schemas.microsoft.com/office/drawing/2014/main" id="{17182FB8-6399-49BE-9713-30167C52B0DB}"/>
+              </a:ext>
+            </a:extLst>
+          </p:cNvPr>
+          <p:cNvSpPr>
+            <a:spLocks noGrp="1"/>
+          </p:cNvSpPr>
+          <p:nvPr>
+            <p:ph type="sldNum" sz="quarter" idx="12"/>
+          </p:nvPr>
+        </p:nvSpPr>
+        <p:spPr/>
+        <p:txBody>
+          <a:bodyPr/>
+          <a:lstStyle/>
+          <a:p>
+            <a:fld id="{A49DFD55-3C28-40EF-9E31-A92D2E4017FF}" type="slidenum">
+              <a:rPr lang="en-US" smtClean="0"/>
+              <a:pPr/>
+              <a:t>17</a:t>
+            </a:fld>
+            <a:endParaRPr lang="en-US" dirty="0"/>
+          </a:p>
+        </p:txBody>
+      </p:sp>
     </p:spTree>
     <p:extLst>
       <p:ext uri="{BB962C8B-B14F-4D97-AF65-F5344CB8AC3E}">
@@ -13154,21 +13348,21 @@
           <p:cNvPr id="2" name="Title 1">
             <a:extLst>
               <a:ext uri="{FF2B5EF4-FFF2-40B4-BE49-F238E27FC236}">
-                <a16:creationId xmlns:a16="http://schemas.microsoft.com/office/drawing/2014/main" id="{B1FE5F11-B7B9-4B80-8C6A-A8A7A7190B77}"/>
-              </a:ext>
-            </a:extLst>
-          </p:cNvPr>
-          <p:cNvSpPr>
-            <a:spLocks noGrp="1"/>
-          </p:cNvSpPr>
-          <p:nvPr>
-            <p:ph type="ctrTitle"/>
-          </p:nvPr>
-        </p:nvSpPr>
-        <p:spPr>
-          <a:xfrm>
-            <a:off x="6991350" y="2148840"/>
-            <a:ext cx="4179570" cy="1715531"/>
+                <a16:creationId xmlns:a16="http://schemas.microsoft.com/office/drawing/2014/main" id="{C4CA0637-CCAA-425E-A57A-6205AFDC8B8C}"/>
+              </a:ext>
+            </a:extLst>
+          </p:cNvPr>
+          <p:cNvSpPr>
+            <a:spLocks noGrp="1"/>
+          </p:cNvSpPr>
+          <p:nvPr>
+            <p:ph type="title"/>
+          </p:nvPr>
+        </p:nvSpPr>
+        <p:spPr>
+          <a:xfrm>
+            <a:off x="4807260" y="321559"/>
+            <a:ext cx="7066687" cy="1089023"/>
           </a:xfrm>
         </p:spPr>
         <p:txBody>
@@ -13177,15 +13371,204 @@
           <a:p>
             <a:r>
               <a:rPr lang="de-DE" dirty="0"/>
-              <a:t>Vorläufige</a:t>
-            </a:r>
-            <a:br>
+              <a:t>Methoden</a:t>
+            </a:r>
+          </a:p>
+        </p:txBody>
+      </p:sp>
+      <p:sp>
+        <p:nvSpPr>
+          <p:cNvPr id="3" name="Text Placeholder 2">
+            <a:extLst>
+              <a:ext uri="{FF2B5EF4-FFF2-40B4-BE49-F238E27FC236}">
+                <a16:creationId xmlns:a16="http://schemas.microsoft.com/office/drawing/2014/main" id="{D851C395-6BC4-4F00-B40B-069DBBB7C08B}"/>
+              </a:ext>
+            </a:extLst>
+          </p:cNvPr>
+          <p:cNvSpPr>
+            <a:spLocks noGrp="1"/>
+          </p:cNvSpPr>
+          <p:nvPr>
+            <p:ph type="body" idx="1"/>
+          </p:nvPr>
+        </p:nvSpPr>
+        <p:spPr>
+          <a:xfrm>
+            <a:off x="1925591" y="945859"/>
+            <a:ext cx="3043974" cy="823912"/>
+          </a:xfrm>
+        </p:spPr>
+        <p:txBody>
+          <a:bodyPr/>
+          <a:lstStyle/>
+          <a:p>
+            <a:r>
+              <a:rPr lang="de-DE" b="1" dirty="0"/>
+              <a:t>X Features</a:t>
+            </a:r>
+            <a:endParaRPr lang="en-US" b="1" dirty="0"/>
+          </a:p>
+        </p:txBody>
+      </p:sp>
+      <p:sp>
+        <p:nvSpPr>
+          <p:cNvPr id="4" name="Content Placeholder 3">
+            <a:extLst>
+              <a:ext uri="{FF2B5EF4-FFF2-40B4-BE49-F238E27FC236}">
+                <a16:creationId xmlns:a16="http://schemas.microsoft.com/office/drawing/2014/main" id="{A1D16151-9486-4A03-AE3A-F1CC562E0564}"/>
+              </a:ext>
+            </a:extLst>
+          </p:cNvPr>
+          <p:cNvSpPr>
+            <a:spLocks noGrp="1"/>
+          </p:cNvSpPr>
+          <p:nvPr>
+            <p:ph sz="half" idx="2"/>
+          </p:nvPr>
+        </p:nvSpPr>
+        <p:spPr>
+          <a:xfrm>
+            <a:off x="1911395" y="1985168"/>
+            <a:ext cx="2882475" cy="390542"/>
+          </a:xfrm>
+        </p:spPr>
+        <p:txBody>
+          <a:bodyPr>
+            <a:normAutofit/>
+          </a:bodyPr>
+          <a:lstStyle/>
+          <a:p>
+            <a:r>
               <a:rPr lang="de-DE" dirty="0"/>
-            </a:br>
+              <a:t>N Aktien mit x Close Preis</a:t>
+            </a:r>
+          </a:p>
+        </p:txBody>
+      </p:sp>
+      <p:sp>
+        <p:nvSpPr>
+          <p:cNvPr id="5" name="Text Placeholder 4">
+            <a:extLst>
+              <a:ext uri="{FF2B5EF4-FFF2-40B4-BE49-F238E27FC236}">
+                <a16:creationId xmlns:a16="http://schemas.microsoft.com/office/drawing/2014/main" id="{DDE59236-37DD-4582-A2A0-3F9A13A3B55D}"/>
+              </a:ext>
+            </a:extLst>
+          </p:cNvPr>
+          <p:cNvSpPr>
+            <a:spLocks noGrp="1"/>
+          </p:cNvSpPr>
+          <p:nvPr>
+            <p:ph type="body" sz="quarter" idx="3"/>
+          </p:nvPr>
+        </p:nvSpPr>
+        <p:spPr>
+          <a:xfrm>
+            <a:off x="6337317" y="945859"/>
+            <a:ext cx="2896671" cy="823912"/>
+          </a:xfrm>
+        </p:spPr>
+        <p:txBody>
+          <a:bodyPr/>
+          <a:lstStyle/>
+          <a:p>
+            <a:r>
+              <a:rPr lang="en-US" b="1" dirty="0"/>
+              <a:t>Y Target</a:t>
+            </a:r>
+          </a:p>
+        </p:txBody>
+      </p:sp>
+      <p:sp>
+        <p:nvSpPr>
+          <p:cNvPr id="6" name="Content Placeholder 5">
+            <a:extLst>
+              <a:ext uri="{FF2B5EF4-FFF2-40B4-BE49-F238E27FC236}">
+                <a16:creationId xmlns:a16="http://schemas.microsoft.com/office/drawing/2014/main" id="{DE1CCF0F-F0BB-42D7-B3C2-C29336739F32}"/>
+              </a:ext>
+            </a:extLst>
+          </p:cNvPr>
+          <p:cNvSpPr>
+            <a:spLocks noGrp="1"/>
+          </p:cNvSpPr>
+          <p:nvPr>
+            <p:ph sz="quarter" idx="4"/>
+          </p:nvPr>
+        </p:nvSpPr>
+        <p:spPr>
+          <a:xfrm>
+            <a:off x="6337317" y="2003530"/>
+            <a:ext cx="2896671" cy="390542"/>
+          </a:xfrm>
+        </p:spPr>
+        <p:txBody>
+          <a:bodyPr>
+            <a:normAutofit/>
+          </a:bodyPr>
+          <a:lstStyle/>
+          <a:p>
             <a:r>
               <a:rPr lang="de-DE" dirty="0"/>
-              <a:t>Ergebnisse</a:t>
-            </a:r>
+              <a:t>y Gewicht für jede N Aktien</a:t>
+            </a:r>
+          </a:p>
+        </p:txBody>
+      </p:sp>
+      <p:pic>
+        <p:nvPicPr>
+          <p:cNvPr id="15" name="Picture 14">
+            <a:extLst>
+              <a:ext uri="{FF2B5EF4-FFF2-40B4-BE49-F238E27FC236}">
+                <a16:creationId xmlns:a16="http://schemas.microsoft.com/office/drawing/2014/main" id="{12660E55-FB12-693F-EC4B-7ABF95E38E8B}"/>
+              </a:ext>
+            </a:extLst>
+          </p:cNvPr>
+          <p:cNvPicPr>
+            <a:picLocks noChangeAspect="1"/>
+          </p:cNvPicPr>
+          <p:nvPr/>
+        </p:nvPicPr>
+        <p:blipFill>
+          <a:blip r:embed="rId2"/>
+          <a:stretch>
+            <a:fillRect/>
+          </a:stretch>
+        </p:blipFill>
+        <p:spPr>
+          <a:xfrm>
+            <a:off x="887896" y="2591107"/>
+            <a:ext cx="9762422" cy="3879628"/>
+          </a:xfrm>
+          <a:prstGeom prst="rect">
+            <a:avLst/>
+          </a:prstGeom>
+        </p:spPr>
+      </p:pic>
+      <p:sp>
+        <p:nvSpPr>
+          <p:cNvPr id="16" name="Slide Number Placeholder 15">
+            <a:extLst>
+              <a:ext uri="{FF2B5EF4-FFF2-40B4-BE49-F238E27FC236}">
+                <a16:creationId xmlns:a16="http://schemas.microsoft.com/office/drawing/2014/main" id="{0C74DA18-4DEB-C1AA-5218-1AEB74A72CE0}"/>
+              </a:ext>
+            </a:extLst>
+          </p:cNvPr>
+          <p:cNvSpPr>
+            <a:spLocks noGrp="1"/>
+          </p:cNvSpPr>
+          <p:nvPr>
+            <p:ph type="sldNum" sz="quarter" idx="12"/>
+          </p:nvPr>
+        </p:nvSpPr>
+        <p:spPr/>
+        <p:txBody>
+          <a:bodyPr/>
+          <a:lstStyle/>
+          <a:p>
+            <a:fld id="{A49DFD55-3C28-40EF-9E31-A92D2E4017FF}" type="slidenum">
+              <a:rPr lang="en-US" smtClean="0"/>
+              <a:pPr/>
+              <a:t>18</a:t>
+            </a:fld>
             <a:endParaRPr lang="en-US" dirty="0"/>
           </a:p>
         </p:txBody>
@@ -13193,7 +13576,7 @@
     </p:spTree>
     <p:extLst>
       <p:ext uri="{BB962C8B-B14F-4D97-AF65-F5344CB8AC3E}">
-        <p14:creationId xmlns:p14="http://schemas.microsoft.com/office/powerpoint/2010/main" val="905108375"/>
+        <p14:creationId xmlns:p14="http://schemas.microsoft.com/office/powerpoint/2010/main" val="675902136"/>
       </p:ext>
     </p:extLst>
   </p:cSld>
@@ -13222,24 +13605,24 @@
       </p:grpSpPr>
       <p:sp>
         <p:nvSpPr>
-          <p:cNvPr id="3" name="Title 2">
-            <a:extLst>
-              <a:ext uri="{FF2B5EF4-FFF2-40B4-BE49-F238E27FC236}">
-                <a16:creationId xmlns:a16="http://schemas.microsoft.com/office/drawing/2014/main" id="{3E5FEE2D-79E5-4C1D-8BF7-EE619CA7039A}"/>
-              </a:ext>
-            </a:extLst>
-          </p:cNvPr>
-          <p:cNvSpPr>
-            <a:spLocks noGrp="1"/>
-          </p:cNvSpPr>
-          <p:nvPr>
-            <p:ph type="title"/>
-          </p:nvPr>
-        </p:nvSpPr>
-        <p:spPr>
-          <a:xfrm>
-            <a:off x="778565" y="113333"/>
-            <a:ext cx="10515600" cy="1325563"/>
+          <p:cNvPr id="2" name="Title 1">
+            <a:extLst>
+              <a:ext uri="{FF2B5EF4-FFF2-40B4-BE49-F238E27FC236}">
+                <a16:creationId xmlns:a16="http://schemas.microsoft.com/office/drawing/2014/main" id="{B1FE5F11-B7B9-4B80-8C6A-A8A7A7190B77}"/>
+              </a:ext>
+            </a:extLst>
+          </p:cNvPr>
+          <p:cNvSpPr>
+            <a:spLocks noGrp="1"/>
+          </p:cNvSpPr>
+          <p:nvPr>
+            <p:ph type="ctrTitle"/>
+          </p:nvPr>
+        </p:nvSpPr>
+        <p:spPr>
+          <a:xfrm>
+            <a:off x="6991350" y="2148840"/>
+            <a:ext cx="4179570" cy="1715531"/>
           </a:xfrm>
         </p:spPr>
         <p:txBody>
@@ -13248,228 +13631,23 @@
           <a:p>
             <a:r>
               <a:rPr lang="de-DE" dirty="0"/>
-              <a:t>Vorläufige Ergebnisse</a:t>
-            </a:r>
-          </a:p>
-        </p:txBody>
-      </p:sp>
-      <p:pic>
-        <p:nvPicPr>
-          <p:cNvPr id="7" name="Picture 6">
-            <a:extLst>
-              <a:ext uri="{FF2B5EF4-FFF2-40B4-BE49-F238E27FC236}">
-                <a16:creationId xmlns:a16="http://schemas.microsoft.com/office/drawing/2014/main" id="{2094233F-7205-85F9-209D-09B7DD5CD962}"/>
-              </a:ext>
-            </a:extLst>
-          </p:cNvPr>
-          <p:cNvPicPr>
-            <a:picLocks noChangeAspect="1"/>
-          </p:cNvPicPr>
-          <p:nvPr/>
-        </p:nvPicPr>
-        <p:blipFill>
-          <a:blip r:embed="rId2"/>
-          <a:stretch>
-            <a:fillRect/>
-          </a:stretch>
-        </p:blipFill>
-        <p:spPr>
-          <a:xfrm>
-            <a:off x="1749132" y="1573188"/>
-            <a:ext cx="2449629" cy="3240919"/>
-          </a:xfrm>
-          <a:prstGeom prst="rect">
-            <a:avLst/>
-          </a:prstGeom>
-        </p:spPr>
-      </p:pic>
-      <p:sp>
-        <p:nvSpPr>
-          <p:cNvPr id="10" name="TextBox 9">
-            <a:extLst>
-              <a:ext uri="{FF2B5EF4-FFF2-40B4-BE49-F238E27FC236}">
-                <a16:creationId xmlns:a16="http://schemas.microsoft.com/office/drawing/2014/main" id="{A9EA959E-66C9-EB86-FB25-20C7D3023577}"/>
-              </a:ext>
-            </a:extLst>
-          </p:cNvPr>
-          <p:cNvSpPr txBox="1"/>
-          <p:nvPr/>
-        </p:nvSpPr>
-        <p:spPr>
-          <a:xfrm>
-            <a:off x="1670910" y="4896678"/>
-            <a:ext cx="2706757" cy="1477328"/>
-          </a:xfrm>
-          <a:prstGeom prst="rect">
-            <a:avLst/>
-          </a:prstGeom>
-          <a:noFill/>
-        </p:spPr>
-        <p:txBody>
-          <a:bodyPr wrap="square" rtlCol="0">
-            <a:spAutoFit/>
-          </a:bodyPr>
-          <a:lstStyle/>
-          <a:p>
-            <a:r>
-              <a:rPr lang="en-US" dirty="0"/>
-              <a:t>Start Date = 1995-01-02</a:t>
-            </a:r>
-          </a:p>
-          <a:p>
-            <a:r>
-              <a:rPr lang="en-US" dirty="0"/>
-              <a:t>End Date = 2000-12-31</a:t>
-            </a:r>
-          </a:p>
-          <a:p>
-            <a:r>
-              <a:rPr lang="en-US" dirty="0"/>
-              <a:t>Epochs = 100</a:t>
-            </a:r>
-          </a:p>
-          <a:p>
-            <a:r>
-              <a:rPr lang="en-US" dirty="0"/>
-              <a:t>Layer = 1 LSTM </a:t>
-            </a:r>
-          </a:p>
-          <a:p>
-            <a:r>
-              <a:rPr lang="en-US" dirty="0"/>
-              <a:t>Nodes = 64</a:t>
-            </a:r>
-          </a:p>
-        </p:txBody>
-      </p:sp>
-      <p:pic>
-        <p:nvPicPr>
-          <p:cNvPr id="12" name="Picture 11">
-            <a:extLst>
-              <a:ext uri="{FF2B5EF4-FFF2-40B4-BE49-F238E27FC236}">
-                <a16:creationId xmlns:a16="http://schemas.microsoft.com/office/drawing/2014/main" id="{BE7D710C-4E43-C715-9C91-E406FE792F58}"/>
-              </a:ext>
-            </a:extLst>
-          </p:cNvPr>
-          <p:cNvPicPr>
-            <a:picLocks noChangeAspect="1"/>
-          </p:cNvPicPr>
-          <p:nvPr/>
-        </p:nvPicPr>
-        <p:blipFill>
-          <a:blip r:embed="rId3"/>
-          <a:stretch>
-            <a:fillRect/>
-          </a:stretch>
-        </p:blipFill>
-        <p:spPr>
-          <a:xfrm>
-            <a:off x="6170055" y="1569808"/>
-            <a:ext cx="2558648" cy="3244299"/>
-          </a:xfrm>
-          <a:prstGeom prst="rect">
-            <a:avLst/>
-          </a:prstGeom>
-        </p:spPr>
-      </p:pic>
-      <p:sp>
-        <p:nvSpPr>
-          <p:cNvPr id="13" name="TextBox 12">
-            <a:extLst>
-              <a:ext uri="{FF2B5EF4-FFF2-40B4-BE49-F238E27FC236}">
-                <a16:creationId xmlns:a16="http://schemas.microsoft.com/office/drawing/2014/main" id="{51302F36-2747-825B-E104-DD029ABB3067}"/>
-              </a:ext>
-            </a:extLst>
-          </p:cNvPr>
-          <p:cNvSpPr txBox="1"/>
-          <p:nvPr/>
-        </p:nvSpPr>
-        <p:spPr>
-          <a:xfrm>
-            <a:off x="6096000" y="4896678"/>
-            <a:ext cx="2706757" cy="1477328"/>
-          </a:xfrm>
-          <a:prstGeom prst="rect">
-            <a:avLst/>
-          </a:prstGeom>
-          <a:noFill/>
-        </p:spPr>
-        <p:txBody>
-          <a:bodyPr wrap="square" rtlCol="0">
-            <a:spAutoFit/>
-          </a:bodyPr>
-          <a:lstStyle/>
-          <a:p>
-            <a:r>
-              <a:rPr lang="en-US" dirty="0"/>
-              <a:t>Start Date = 2001-01-02</a:t>
-            </a:r>
-          </a:p>
-          <a:p>
-            <a:r>
-              <a:rPr lang="en-US" dirty="0"/>
-              <a:t>End Date = 2010-12-31</a:t>
-            </a:r>
-          </a:p>
-          <a:p>
-            <a:r>
-              <a:rPr lang="en-US" dirty="0"/>
-              <a:t>Epochs = 100</a:t>
-            </a:r>
-          </a:p>
-          <a:p>
-            <a:r>
-              <a:rPr lang="en-US" dirty="0"/>
-              <a:t>Layer = 1 LSTM </a:t>
-            </a:r>
-          </a:p>
-          <a:p>
-            <a:r>
-              <a:rPr lang="en-US" dirty="0"/>
-              <a:t>Nodes = 64</a:t>
-            </a:r>
-          </a:p>
-        </p:txBody>
-      </p:sp>
-      <p:sp>
-        <p:nvSpPr>
-          <p:cNvPr id="14" name="TextBox 13">
-            <a:extLst>
-              <a:ext uri="{FF2B5EF4-FFF2-40B4-BE49-F238E27FC236}">
-                <a16:creationId xmlns:a16="http://schemas.microsoft.com/office/drawing/2014/main" id="{161C3FFD-72F4-FAB7-C7A1-EED5B0D45B3A}"/>
-              </a:ext>
-            </a:extLst>
-          </p:cNvPr>
-          <p:cNvSpPr txBox="1"/>
-          <p:nvPr/>
-        </p:nvSpPr>
-        <p:spPr>
-          <a:xfrm>
-            <a:off x="8763155" y="2484782"/>
-            <a:ext cx="3293166" cy="369332"/>
-          </a:xfrm>
-          <a:prstGeom prst="rect">
-            <a:avLst/>
-          </a:prstGeom>
-          <a:noFill/>
-        </p:spPr>
-        <p:txBody>
-          <a:bodyPr wrap="square" rtlCol="0">
-            <a:spAutoFit/>
-          </a:bodyPr>
-          <a:lstStyle/>
-          <a:p>
-            <a:r>
+              <a:t>Vorläufige</a:t>
+            </a:r>
+            <a:br>
               <a:rPr lang="de-DE" dirty="0"/>
-              <a:t>&lt;- Apple ist überwiegend</a:t>
-            </a:r>
+            </a:br>
+            <a:r>
+              <a:rPr lang="de-DE" dirty="0"/>
+              <a:t>Ergebnisse</a:t>
+            </a:r>
+            <a:endParaRPr lang="en-US" dirty="0"/>
           </a:p>
         </p:txBody>
       </p:sp>
     </p:spTree>
     <p:extLst>
       <p:ext uri="{BB962C8B-B14F-4D97-AF65-F5344CB8AC3E}">
-        <p14:creationId xmlns:p14="http://schemas.microsoft.com/office/powerpoint/2010/main" val="2499682613"/>
+        <p14:creationId xmlns:p14="http://schemas.microsoft.com/office/powerpoint/2010/main" val="905108375"/>
       </p:ext>
     </p:extLst>
   </p:cSld>
@@ -13526,37 +13704,37 @@
           <a:p>
             <a:r>
               <a:rPr lang="de-DE" sz="1600" b="1" dirty="0"/>
-              <a:t>Motivation</a:t>
+              <a:t>Motivation … 3</a:t>
             </a:r>
           </a:p>
           <a:p>
             <a:r>
               <a:rPr lang="de-DE" sz="1600" b="1" dirty="0"/>
-              <a:t>Literatur</a:t>
+              <a:t>Literatur … 6</a:t>
             </a:r>
           </a:p>
           <a:p>
             <a:r>
               <a:rPr lang="de-DE" sz="1600" b="1" dirty="0"/>
-              <a:t>Ziele</a:t>
+              <a:t>Ziele … 10</a:t>
             </a:r>
           </a:p>
           <a:p>
             <a:r>
               <a:rPr lang="de-DE" sz="1600" b="1" dirty="0"/>
-              <a:t>Daten</a:t>
+              <a:t>Daten … 13</a:t>
             </a:r>
           </a:p>
           <a:p>
             <a:r>
               <a:rPr lang="de-DE" sz="1600" b="1" dirty="0"/>
-              <a:t>Methoden</a:t>
+              <a:t>Methoden … 15 </a:t>
             </a:r>
           </a:p>
           <a:p>
             <a:r>
               <a:rPr lang="de-DE" sz="1600" b="1" dirty="0"/>
-              <a:t>Vorläufige Ergebnisse</a:t>
+              <a:t>Vorläufige Ergebnisse … 19</a:t>
             </a:r>
           </a:p>
         </p:txBody>
@@ -13591,6 +13769,36 @@
               <a:rPr lang="en-US" dirty="0"/>
               <a:t>AGENDA</a:t>
             </a:r>
+          </a:p>
+        </p:txBody>
+      </p:sp>
+      <p:sp>
+        <p:nvSpPr>
+          <p:cNvPr id="4" name="Slide Number Placeholder 3">
+            <a:extLst>
+              <a:ext uri="{FF2B5EF4-FFF2-40B4-BE49-F238E27FC236}">
+                <a16:creationId xmlns:a16="http://schemas.microsoft.com/office/drawing/2014/main" id="{23A9D843-F4D1-DD83-27B0-CC67DC1D3782}"/>
+              </a:ext>
+            </a:extLst>
+          </p:cNvPr>
+          <p:cNvSpPr>
+            <a:spLocks noGrp="1"/>
+          </p:cNvSpPr>
+          <p:nvPr>
+            <p:ph type="sldNum" sz="quarter" idx="12"/>
+          </p:nvPr>
+        </p:nvSpPr>
+        <p:spPr/>
+        <p:txBody>
+          <a:bodyPr/>
+          <a:lstStyle/>
+          <a:p>
+            <a:fld id="{A49DFD55-3C28-40EF-9E31-A92D2E4017FF}" type="slidenum">
+              <a:rPr lang="en-US" smtClean="0"/>
+              <a:pPr/>
+              <a:t>2</a:t>
+            </a:fld>
+            <a:endParaRPr lang="en-US" dirty="0"/>
           </a:p>
         </p:txBody>
       </p:sp>
@@ -13626,10 +13834,10 @@
       </p:grpSpPr>
       <p:sp>
         <p:nvSpPr>
-          <p:cNvPr id="2" name="Title 1">
-            <a:extLst>
-              <a:ext uri="{FF2B5EF4-FFF2-40B4-BE49-F238E27FC236}">
-                <a16:creationId xmlns:a16="http://schemas.microsoft.com/office/drawing/2014/main" id="{4518FC28-E0BD-4387-B8BE-9965D1A57FF1}"/>
+          <p:cNvPr id="3" name="Title 2">
+            <a:extLst>
+              <a:ext uri="{FF2B5EF4-FFF2-40B4-BE49-F238E27FC236}">
+                <a16:creationId xmlns:a16="http://schemas.microsoft.com/office/drawing/2014/main" id="{3E5FEE2D-79E5-4C1D-8BF7-EE619CA7039A}"/>
               </a:ext>
             </a:extLst>
           </p:cNvPr>
@@ -13642,8 +13850,8 @@
         </p:nvSpPr>
         <p:spPr>
           <a:xfrm>
-            <a:off x="5476875" y="1671639"/>
-            <a:ext cx="5111750" cy="1204912"/>
+            <a:off x="778565" y="113333"/>
+            <a:ext cx="10515600" cy="1325563"/>
           </a:xfrm>
         </p:spPr>
         <p:txBody>
@@ -13652,95 +13860,47 @@
           <a:p>
             <a:r>
               <a:rPr lang="de-DE" dirty="0"/>
-              <a:t>Zusammenfassung</a:t>
-            </a:r>
-          </a:p>
-        </p:txBody>
-      </p:sp>
-      <p:sp>
-        <p:nvSpPr>
-          <p:cNvPr id="3" name="Text Placeholder 2">
-            <a:extLst>
-              <a:ext uri="{FF2B5EF4-FFF2-40B4-BE49-F238E27FC236}">
-                <a16:creationId xmlns:a16="http://schemas.microsoft.com/office/drawing/2014/main" id="{FED19BCA-B61F-4EA6-A1FB-CCA3BD8506FB}"/>
-              </a:ext>
-            </a:extLst>
-          </p:cNvPr>
-          <p:cNvSpPr>
-            <a:spLocks noGrp="1"/>
-          </p:cNvSpPr>
-          <p:nvPr>
-            <p:ph type="body" idx="1"/>
-          </p:nvPr>
-        </p:nvSpPr>
-        <p:spPr>
-          <a:xfrm>
-            <a:off x="5476875" y="3203572"/>
-            <a:ext cx="5820603" cy="2812915"/>
-          </a:xfrm>
-        </p:spPr>
-        <p:txBody>
-          <a:bodyPr>
-            <a:normAutofit/>
-          </a:bodyPr>
-          <a:lstStyle/>
-          <a:p>
-            <a:r>
-              <a:rPr lang="de-DE" b="1" dirty="0"/>
-              <a:t>Was habe ich gemacht?</a:t>
-            </a:r>
-          </a:p>
-          <a:p>
-            <a:r>
-              <a:rPr lang="de-DE" dirty="0"/>
-              <a:t>Daten vorbereitet und erste Modell gebaut</a:t>
-            </a:r>
-          </a:p>
-          <a:p>
-            <a:r>
-              <a:rPr lang="de-DE" b="1" dirty="0"/>
-              <a:t>Was kann ich weiter tun?</a:t>
-            </a:r>
-          </a:p>
-          <a:p>
-            <a:r>
-              <a:rPr lang="de-DE" dirty="0"/>
-              <a:t>Das Modell optimieren und es benutzen, um die Rendite des Portfolios zu erhöhen</a:t>
-            </a:r>
-          </a:p>
-          <a:p>
-            <a:r>
-              <a:rPr lang="de-DE" b="1" dirty="0"/>
-              <a:t>Gibt es andere Methoden?</a:t>
-            </a:r>
-          </a:p>
-          <a:p>
-            <a:r>
-              <a:rPr lang="de-DE" dirty="0"/>
-              <a:t>Wie ist das KNN-LSTM </a:t>
-            </a:r>
-            <a:r>
-              <a:rPr lang="de-DE" dirty="0" err="1"/>
-              <a:t>model</a:t>
-            </a:r>
-            <a:r>
-              <a:rPr lang="de-DE" dirty="0"/>
-              <a:t> im Vergleich zu Methoden wie von </a:t>
-            </a:r>
-            <a:r>
-              <a:rPr lang="de-DE" dirty="0" err="1"/>
-              <a:t>gurobi_optimods.sharpe_ratio</a:t>
-            </a:r>
-            <a:endParaRPr lang="de-DE" dirty="0"/>
-          </a:p>
-        </p:txBody>
-      </p:sp>
-      <p:sp>
-        <p:nvSpPr>
-          <p:cNvPr id="7" name="TextBox 6">
-            <a:extLst>
-              <a:ext uri="{FF2B5EF4-FFF2-40B4-BE49-F238E27FC236}">
-                <a16:creationId xmlns:a16="http://schemas.microsoft.com/office/drawing/2014/main" id="{EA647766-7523-CEB9-6418-CE9E1FAD5FA9}"/>
+              <a:t>Vorläufige Ergebnisse</a:t>
+            </a:r>
+          </a:p>
+        </p:txBody>
+      </p:sp>
+      <p:pic>
+        <p:nvPicPr>
+          <p:cNvPr id="7" name="Picture 6">
+            <a:extLst>
+              <a:ext uri="{FF2B5EF4-FFF2-40B4-BE49-F238E27FC236}">
+                <a16:creationId xmlns:a16="http://schemas.microsoft.com/office/drawing/2014/main" id="{2094233F-7205-85F9-209D-09B7DD5CD962}"/>
+              </a:ext>
+            </a:extLst>
+          </p:cNvPr>
+          <p:cNvPicPr>
+            <a:picLocks noChangeAspect="1"/>
+          </p:cNvPicPr>
+          <p:nvPr/>
+        </p:nvPicPr>
+        <p:blipFill>
+          <a:blip r:embed="rId2"/>
+          <a:stretch>
+            <a:fillRect/>
+          </a:stretch>
+        </p:blipFill>
+        <p:spPr>
+          <a:xfrm>
+            <a:off x="1749132" y="1573188"/>
+            <a:ext cx="2449629" cy="3240919"/>
+          </a:xfrm>
+          <a:prstGeom prst="rect">
+            <a:avLst/>
+          </a:prstGeom>
+        </p:spPr>
+      </p:pic>
+      <p:sp>
+        <p:nvSpPr>
+          <p:cNvPr id="10" name="TextBox 9">
+            <a:extLst>
+              <a:ext uri="{FF2B5EF4-FFF2-40B4-BE49-F238E27FC236}">
+                <a16:creationId xmlns:a16="http://schemas.microsoft.com/office/drawing/2014/main" id="{A9EA959E-66C9-EB86-FB25-20C7D3023577}"/>
               </a:ext>
             </a:extLst>
           </p:cNvPr>
@@ -13749,8 +13909,8 @@
         </p:nvSpPr>
         <p:spPr>
           <a:xfrm>
-            <a:off x="1378364" y="6266478"/>
-            <a:ext cx="10336557" cy="338554"/>
+            <a:off x="1670910" y="4896678"/>
+            <a:ext cx="2706757" cy="1477328"/>
           </a:xfrm>
           <a:prstGeom prst="rect">
             <a:avLst/>
@@ -13758,22 +13918,200 @@
           <a:noFill/>
         </p:spPr>
         <p:txBody>
-          <a:bodyPr wrap="square">
+          <a:bodyPr wrap="square" rtlCol="0">
             <a:spAutoFit/>
           </a:bodyPr>
           <a:lstStyle/>
           <a:p>
             <a:r>
-              <a:rPr lang="en-US" sz="1600" i="1" dirty="0"/>
-              <a:t>https://gurobi-optimization-gurobi-optimods.readthedocs-hosted.com/en/stable/mods/sharpe-ratio.html</a:t>
-            </a:r>
+              <a:rPr lang="en-US" dirty="0"/>
+              <a:t>Start Date = 1995-01-02</a:t>
+            </a:r>
+          </a:p>
+          <a:p>
+            <a:r>
+              <a:rPr lang="en-US" dirty="0"/>
+              <a:t>End Date = 2000-12-31</a:t>
+            </a:r>
+          </a:p>
+          <a:p>
+            <a:r>
+              <a:rPr lang="en-US" dirty="0"/>
+              <a:t>Epochs = 100</a:t>
+            </a:r>
+          </a:p>
+          <a:p>
+            <a:r>
+              <a:rPr lang="en-US" dirty="0"/>
+              <a:t>Layer = 1 LSTM </a:t>
+            </a:r>
+          </a:p>
+          <a:p>
+            <a:r>
+              <a:rPr lang="en-US" dirty="0"/>
+              <a:t>Nodes = 64</a:t>
+            </a:r>
+          </a:p>
+        </p:txBody>
+      </p:sp>
+      <p:pic>
+        <p:nvPicPr>
+          <p:cNvPr id="12" name="Picture 11">
+            <a:extLst>
+              <a:ext uri="{FF2B5EF4-FFF2-40B4-BE49-F238E27FC236}">
+                <a16:creationId xmlns:a16="http://schemas.microsoft.com/office/drawing/2014/main" id="{BE7D710C-4E43-C715-9C91-E406FE792F58}"/>
+              </a:ext>
+            </a:extLst>
+          </p:cNvPr>
+          <p:cNvPicPr>
+            <a:picLocks noChangeAspect="1"/>
+          </p:cNvPicPr>
+          <p:nvPr/>
+        </p:nvPicPr>
+        <p:blipFill>
+          <a:blip r:embed="rId3"/>
+          <a:stretch>
+            <a:fillRect/>
+          </a:stretch>
+        </p:blipFill>
+        <p:spPr>
+          <a:xfrm>
+            <a:off x="6170055" y="1569808"/>
+            <a:ext cx="2558648" cy="3244299"/>
+          </a:xfrm>
+          <a:prstGeom prst="rect">
+            <a:avLst/>
+          </a:prstGeom>
+        </p:spPr>
+      </p:pic>
+      <p:sp>
+        <p:nvSpPr>
+          <p:cNvPr id="13" name="TextBox 12">
+            <a:extLst>
+              <a:ext uri="{FF2B5EF4-FFF2-40B4-BE49-F238E27FC236}">
+                <a16:creationId xmlns:a16="http://schemas.microsoft.com/office/drawing/2014/main" id="{51302F36-2747-825B-E104-DD029ABB3067}"/>
+              </a:ext>
+            </a:extLst>
+          </p:cNvPr>
+          <p:cNvSpPr txBox="1"/>
+          <p:nvPr/>
+        </p:nvSpPr>
+        <p:spPr>
+          <a:xfrm>
+            <a:off x="6096000" y="4896678"/>
+            <a:ext cx="2706757" cy="1477328"/>
+          </a:xfrm>
+          <a:prstGeom prst="rect">
+            <a:avLst/>
+          </a:prstGeom>
+          <a:noFill/>
+        </p:spPr>
+        <p:txBody>
+          <a:bodyPr wrap="square" rtlCol="0">
+            <a:spAutoFit/>
+          </a:bodyPr>
+          <a:lstStyle/>
+          <a:p>
+            <a:r>
+              <a:rPr lang="en-US" dirty="0"/>
+              <a:t>Start Date = 2001-01-02</a:t>
+            </a:r>
+          </a:p>
+          <a:p>
+            <a:r>
+              <a:rPr lang="en-US" dirty="0"/>
+              <a:t>End Date = 2010-12-31</a:t>
+            </a:r>
+          </a:p>
+          <a:p>
+            <a:r>
+              <a:rPr lang="en-US" dirty="0"/>
+              <a:t>Epochs = 100</a:t>
+            </a:r>
+          </a:p>
+          <a:p>
+            <a:r>
+              <a:rPr lang="en-US" dirty="0"/>
+              <a:t>Layer = 1 LSTM </a:t>
+            </a:r>
+          </a:p>
+          <a:p>
+            <a:r>
+              <a:rPr lang="en-US" dirty="0"/>
+              <a:t>Nodes = 64</a:t>
+            </a:r>
+          </a:p>
+        </p:txBody>
+      </p:sp>
+      <p:sp>
+        <p:nvSpPr>
+          <p:cNvPr id="14" name="TextBox 13">
+            <a:extLst>
+              <a:ext uri="{FF2B5EF4-FFF2-40B4-BE49-F238E27FC236}">
+                <a16:creationId xmlns:a16="http://schemas.microsoft.com/office/drawing/2014/main" id="{161C3FFD-72F4-FAB7-C7A1-EED5B0D45B3A}"/>
+              </a:ext>
+            </a:extLst>
+          </p:cNvPr>
+          <p:cNvSpPr txBox="1"/>
+          <p:nvPr/>
+        </p:nvSpPr>
+        <p:spPr>
+          <a:xfrm>
+            <a:off x="8763155" y="2484782"/>
+            <a:ext cx="3293166" cy="369332"/>
+          </a:xfrm>
+          <a:prstGeom prst="rect">
+            <a:avLst/>
+          </a:prstGeom>
+          <a:noFill/>
+        </p:spPr>
+        <p:txBody>
+          <a:bodyPr wrap="square" rtlCol="0">
+            <a:spAutoFit/>
+          </a:bodyPr>
+          <a:lstStyle/>
+          <a:p>
+            <a:r>
+              <a:rPr lang="de-DE" dirty="0"/>
+              <a:t>&lt;- Apple ist überwiegend </a:t>
+            </a:r>
+          </a:p>
+        </p:txBody>
+      </p:sp>
+      <p:sp>
+        <p:nvSpPr>
+          <p:cNvPr id="2" name="Slide Number Placeholder 1">
+            <a:extLst>
+              <a:ext uri="{FF2B5EF4-FFF2-40B4-BE49-F238E27FC236}">
+                <a16:creationId xmlns:a16="http://schemas.microsoft.com/office/drawing/2014/main" id="{5FE94FC6-3905-20E4-319D-BCD18EC87B89}"/>
+              </a:ext>
+            </a:extLst>
+          </p:cNvPr>
+          <p:cNvSpPr>
+            <a:spLocks noGrp="1"/>
+          </p:cNvSpPr>
+          <p:nvPr>
+            <p:ph type="sldNum" sz="quarter" idx="12"/>
+          </p:nvPr>
+        </p:nvSpPr>
+        <p:spPr/>
+        <p:txBody>
+          <a:bodyPr/>
+          <a:lstStyle/>
+          <a:p>
+            <a:fld id="{A49DFD55-3C28-40EF-9E31-A92D2E4017FF}" type="slidenum">
+              <a:rPr lang="en-US" smtClean="0"/>
+              <a:pPr/>
+              <a:t>20</a:t>
+            </a:fld>
+            <a:endParaRPr lang="en-US" dirty="0"/>
           </a:p>
         </p:txBody>
       </p:sp>
     </p:spTree>
     <p:extLst>
       <p:ext uri="{BB962C8B-B14F-4D97-AF65-F5344CB8AC3E}">
-        <p14:creationId xmlns:p14="http://schemas.microsoft.com/office/powerpoint/2010/main" val="1742861620"/>
+        <p14:creationId xmlns:p14="http://schemas.microsoft.com/office/powerpoint/2010/main" val="2499682613"/>
       </p:ext>
     </p:extLst>
   </p:cSld>
@@ -13805,21 +14143,21 @@
           <p:cNvPr id="2" name="Title 1">
             <a:extLst>
               <a:ext uri="{FF2B5EF4-FFF2-40B4-BE49-F238E27FC236}">
-                <a16:creationId xmlns:a16="http://schemas.microsoft.com/office/drawing/2014/main" id="{8BDF1EDE-5423-435C-B149-87AB1BC22B83}"/>
-              </a:ext>
-            </a:extLst>
-          </p:cNvPr>
-          <p:cNvSpPr>
-            <a:spLocks noGrp="1"/>
-          </p:cNvSpPr>
-          <p:nvPr>
-            <p:ph type="ctrTitle"/>
-          </p:nvPr>
-        </p:nvSpPr>
-        <p:spPr>
-          <a:xfrm>
-            <a:off x="4267200" y="1615736"/>
-            <a:ext cx="4179570" cy="1524735"/>
+                <a16:creationId xmlns:a16="http://schemas.microsoft.com/office/drawing/2014/main" id="{4518FC28-E0BD-4387-B8BE-9965D1A57FF1}"/>
+              </a:ext>
+            </a:extLst>
+          </p:cNvPr>
+          <p:cNvSpPr>
+            <a:spLocks noGrp="1"/>
+          </p:cNvSpPr>
+          <p:nvPr>
+            <p:ph type="title"/>
+          </p:nvPr>
+        </p:nvSpPr>
+        <p:spPr>
+          <a:xfrm>
+            <a:off x="5476875" y="1671639"/>
+            <a:ext cx="5111750" cy="1204912"/>
           </a:xfrm>
         </p:spPr>
         <p:txBody>
@@ -13828,35 +14166,31 @@
           <a:p>
             <a:r>
               <a:rPr lang="de-DE" dirty="0"/>
-              <a:t>Vielen</a:t>
-            </a:r>
-            <a:r>
-              <a:rPr lang="en-US" dirty="0"/>
-              <a:t> Dank!</a:t>
-            </a:r>
-          </a:p>
-        </p:txBody>
-      </p:sp>
-      <p:sp>
-        <p:nvSpPr>
-          <p:cNvPr id="3" name="Subtitle 2">
-            <a:extLst>
-              <a:ext uri="{FF2B5EF4-FFF2-40B4-BE49-F238E27FC236}">
-                <a16:creationId xmlns:a16="http://schemas.microsoft.com/office/drawing/2014/main" id="{AF64C29E-DF30-4DC6-AB95-2016F9A703B6}"/>
-              </a:ext>
-            </a:extLst>
-          </p:cNvPr>
-          <p:cNvSpPr>
-            <a:spLocks noGrp="1"/>
-          </p:cNvSpPr>
-          <p:nvPr>
-            <p:ph type="subTitle" idx="1"/>
-          </p:nvPr>
-        </p:nvSpPr>
-        <p:spPr>
-          <a:xfrm>
-            <a:off x="4267199" y="3238103"/>
-            <a:ext cx="6187711" cy="2183561"/>
+              <a:t>Zusammenfassung</a:t>
+            </a:r>
+          </a:p>
+        </p:txBody>
+      </p:sp>
+      <p:sp>
+        <p:nvSpPr>
+          <p:cNvPr id="3" name="Text Placeholder 2">
+            <a:extLst>
+              <a:ext uri="{FF2B5EF4-FFF2-40B4-BE49-F238E27FC236}">
+                <a16:creationId xmlns:a16="http://schemas.microsoft.com/office/drawing/2014/main" id="{FED19BCA-B61F-4EA6-A1FB-CCA3BD8506FB}"/>
+              </a:ext>
+            </a:extLst>
+          </p:cNvPr>
+          <p:cNvSpPr>
+            <a:spLocks noGrp="1"/>
+          </p:cNvSpPr>
+          <p:nvPr>
+            <p:ph type="body" idx="1"/>
+          </p:nvPr>
+        </p:nvSpPr>
+        <p:spPr>
+          <a:xfrm>
+            <a:off x="5476875" y="3203572"/>
+            <a:ext cx="5820603" cy="2812915"/>
           </a:xfrm>
         </p:spPr>
         <p:txBody>
@@ -13866,6 +14200,216 @@
           <a:lstStyle/>
           <a:p>
             <a:r>
+              <a:rPr lang="de-DE" b="1" dirty="0"/>
+              <a:t>Was habe ich gemacht?</a:t>
+            </a:r>
+          </a:p>
+          <a:p>
+            <a:r>
+              <a:rPr lang="de-DE" dirty="0"/>
+              <a:t>Daten vorbereitet und erste Modell gebaut</a:t>
+            </a:r>
+          </a:p>
+          <a:p>
+            <a:r>
+              <a:rPr lang="de-DE" b="1" dirty="0"/>
+              <a:t>Was kann ich weiter tun?</a:t>
+            </a:r>
+          </a:p>
+          <a:p>
+            <a:r>
+              <a:rPr lang="de-DE" dirty="0"/>
+              <a:t>Das Modell optimieren und es benutzen, um die Rendite des Portfolios zu erhöhen</a:t>
+            </a:r>
+          </a:p>
+          <a:p>
+            <a:r>
+              <a:rPr lang="de-DE" b="1" dirty="0"/>
+              <a:t>Gibt es andere Methoden?</a:t>
+            </a:r>
+          </a:p>
+          <a:p>
+            <a:r>
+              <a:rPr lang="de-DE" dirty="0"/>
+              <a:t>Wie ist das KNN-LSTM </a:t>
+            </a:r>
+            <a:r>
+              <a:rPr lang="de-DE" dirty="0" err="1"/>
+              <a:t>model</a:t>
+            </a:r>
+            <a:r>
+              <a:rPr lang="de-DE" dirty="0"/>
+              <a:t> im Vergleich zu Methoden wie von </a:t>
+            </a:r>
+            <a:r>
+              <a:rPr lang="de-DE" dirty="0" err="1"/>
+              <a:t>gurobi_optimods.sharpe_ratio</a:t>
+            </a:r>
+            <a:endParaRPr lang="de-DE" dirty="0"/>
+          </a:p>
+        </p:txBody>
+      </p:sp>
+      <p:sp>
+        <p:nvSpPr>
+          <p:cNvPr id="7" name="TextBox 6">
+            <a:extLst>
+              <a:ext uri="{FF2B5EF4-FFF2-40B4-BE49-F238E27FC236}">
+                <a16:creationId xmlns:a16="http://schemas.microsoft.com/office/drawing/2014/main" id="{EA647766-7523-CEB9-6418-CE9E1FAD5FA9}"/>
+              </a:ext>
+            </a:extLst>
+          </p:cNvPr>
+          <p:cNvSpPr txBox="1"/>
+          <p:nvPr/>
+        </p:nvSpPr>
+        <p:spPr>
+          <a:xfrm>
+            <a:off x="1378364" y="6266478"/>
+            <a:ext cx="10336557" cy="338554"/>
+          </a:xfrm>
+          <a:prstGeom prst="rect">
+            <a:avLst/>
+          </a:prstGeom>
+          <a:noFill/>
+        </p:spPr>
+        <p:txBody>
+          <a:bodyPr wrap="square">
+            <a:spAutoFit/>
+          </a:bodyPr>
+          <a:lstStyle/>
+          <a:p>
+            <a:r>
+              <a:rPr lang="en-US" sz="1600" i="1" dirty="0"/>
+              <a:t>https://gurobi-optimization-gurobi-optimods.readthedocs-hosted.com/en/stable/mods/sharpe-ratio.html</a:t>
+            </a:r>
+          </a:p>
+        </p:txBody>
+      </p:sp>
+      <p:sp>
+        <p:nvSpPr>
+          <p:cNvPr id="4" name="Slide Number Placeholder 3">
+            <a:extLst>
+              <a:ext uri="{FF2B5EF4-FFF2-40B4-BE49-F238E27FC236}">
+                <a16:creationId xmlns:a16="http://schemas.microsoft.com/office/drawing/2014/main" id="{D9D74978-A331-831A-A5B4-8DD3639D31DE}"/>
+              </a:ext>
+            </a:extLst>
+          </p:cNvPr>
+          <p:cNvSpPr>
+            <a:spLocks noGrp="1"/>
+          </p:cNvSpPr>
+          <p:nvPr>
+            <p:ph type="sldNum" sz="quarter" idx="12"/>
+          </p:nvPr>
+        </p:nvSpPr>
+        <p:spPr/>
+        <p:txBody>
+          <a:bodyPr/>
+          <a:lstStyle/>
+          <a:p>
+            <a:fld id="{A49DFD55-3C28-40EF-9E31-A92D2E4017FF}" type="slidenum">
+              <a:rPr lang="en-US" smtClean="0"/>
+              <a:pPr/>
+              <a:t>21</a:t>
+            </a:fld>
+            <a:endParaRPr lang="en-US" dirty="0"/>
+          </a:p>
+        </p:txBody>
+      </p:sp>
+    </p:spTree>
+    <p:extLst>
+      <p:ext uri="{BB962C8B-B14F-4D97-AF65-F5344CB8AC3E}">
+        <p14:creationId xmlns:p14="http://schemas.microsoft.com/office/powerpoint/2010/main" val="1742861620"/>
+      </p:ext>
+    </p:extLst>
+  </p:cSld>
+  <p:clrMapOvr>
+    <a:masterClrMapping/>
+  </p:clrMapOvr>
+</p:sld>
+</file>
+
+<file path=ppt/slides/slide22.xml><?xml version="1.0" encoding="utf-8"?>
+<p:sld xmlns:a="http://schemas.openxmlformats.org/drawingml/2006/main" xmlns:r="http://schemas.openxmlformats.org/officeDocument/2006/relationships" xmlns:p="http://schemas.openxmlformats.org/presentationml/2006/main">
+  <p:cSld>
+    <p:spTree>
+      <p:nvGrpSpPr>
+        <p:cNvPr id="1" name=""/>
+        <p:cNvGrpSpPr/>
+        <p:nvPr/>
+      </p:nvGrpSpPr>
+      <p:grpSpPr>
+        <a:xfrm>
+          <a:off x="0" y="0"/>
+          <a:ext cx="0" cy="0"/>
+          <a:chOff x="0" y="0"/>
+          <a:chExt cx="0" cy="0"/>
+        </a:xfrm>
+      </p:grpSpPr>
+      <p:sp>
+        <p:nvSpPr>
+          <p:cNvPr id="2" name="Title 1">
+            <a:extLst>
+              <a:ext uri="{FF2B5EF4-FFF2-40B4-BE49-F238E27FC236}">
+                <a16:creationId xmlns:a16="http://schemas.microsoft.com/office/drawing/2014/main" id="{8BDF1EDE-5423-435C-B149-87AB1BC22B83}"/>
+              </a:ext>
+            </a:extLst>
+          </p:cNvPr>
+          <p:cNvSpPr>
+            <a:spLocks noGrp="1"/>
+          </p:cNvSpPr>
+          <p:nvPr>
+            <p:ph type="ctrTitle"/>
+          </p:nvPr>
+        </p:nvSpPr>
+        <p:spPr>
+          <a:xfrm>
+            <a:off x="4267200" y="1615736"/>
+            <a:ext cx="4179570" cy="1524735"/>
+          </a:xfrm>
+        </p:spPr>
+        <p:txBody>
+          <a:bodyPr/>
+          <a:lstStyle/>
+          <a:p>
+            <a:r>
+              <a:rPr lang="de-DE" dirty="0"/>
+              <a:t>Vielen</a:t>
+            </a:r>
+            <a:r>
+              <a:rPr lang="en-US" dirty="0"/>
+              <a:t> Dank!</a:t>
+            </a:r>
+          </a:p>
+        </p:txBody>
+      </p:sp>
+      <p:sp>
+        <p:nvSpPr>
+          <p:cNvPr id="3" name="Subtitle 2">
+            <a:extLst>
+              <a:ext uri="{FF2B5EF4-FFF2-40B4-BE49-F238E27FC236}">
+                <a16:creationId xmlns:a16="http://schemas.microsoft.com/office/drawing/2014/main" id="{AF64C29E-DF30-4DC6-AB95-2016F9A703B6}"/>
+              </a:ext>
+            </a:extLst>
+          </p:cNvPr>
+          <p:cNvSpPr>
+            <a:spLocks noGrp="1"/>
+          </p:cNvSpPr>
+          <p:nvPr>
+            <p:ph type="subTitle" idx="1"/>
+          </p:nvPr>
+        </p:nvSpPr>
+        <p:spPr>
+          <a:xfrm>
+            <a:off x="4267199" y="3238103"/>
+            <a:ext cx="6187711" cy="2183561"/>
+          </a:xfrm>
+        </p:spPr>
+        <p:txBody>
+          <a:bodyPr>
+            <a:normAutofit/>
+          </a:bodyPr>
+          <a:lstStyle/>
+          <a:p>
+            <a:r>
               <a:rPr lang="en-US" dirty="0"/>
               <a:t>Patrick Spohr</a:t>
             </a:r>
@@ -13899,6 +14443,36 @@
               <a:rPr lang="en-US" dirty="0"/>
               <a:t>-Sayer</a:t>
             </a:r>
+          </a:p>
+        </p:txBody>
+      </p:sp>
+      <p:sp>
+        <p:nvSpPr>
+          <p:cNvPr id="4" name="Slide Number Placeholder 3">
+            <a:extLst>
+              <a:ext uri="{FF2B5EF4-FFF2-40B4-BE49-F238E27FC236}">
+                <a16:creationId xmlns:a16="http://schemas.microsoft.com/office/drawing/2014/main" id="{924296BC-17ED-0C9D-A95F-88FB237DA528}"/>
+              </a:ext>
+            </a:extLst>
+          </p:cNvPr>
+          <p:cNvSpPr>
+            <a:spLocks noGrp="1"/>
+          </p:cNvSpPr>
+          <p:nvPr>
+            <p:ph type="sldNum" sz="quarter" idx="12"/>
+          </p:nvPr>
+        </p:nvSpPr>
+        <p:spPr/>
+        <p:txBody>
+          <a:bodyPr/>
+          <a:lstStyle/>
+          <a:p>
+            <a:fld id="{A49DFD55-3C28-40EF-9E31-A92D2E4017FF}" type="slidenum">
+              <a:rPr lang="en-US" smtClean="0"/>
+              <a:pPr/>
+              <a:t>22</a:t>
+            </a:fld>
+            <a:endParaRPr lang="en-US" dirty="0"/>
           </a:p>
         </p:txBody>
       </p:sp>
@@ -14526,6 +15100,36 @@
           </a:p>
         </p:txBody>
       </p:sp>
+      <p:sp>
+        <p:nvSpPr>
+          <p:cNvPr id="5" name="Slide Number Placeholder 4">
+            <a:extLst>
+              <a:ext uri="{FF2B5EF4-FFF2-40B4-BE49-F238E27FC236}">
+                <a16:creationId xmlns:a16="http://schemas.microsoft.com/office/drawing/2014/main" id="{D388B17D-134F-C3D5-F191-8B229EF09A04}"/>
+              </a:ext>
+            </a:extLst>
+          </p:cNvPr>
+          <p:cNvSpPr>
+            <a:spLocks noGrp="1"/>
+          </p:cNvSpPr>
+          <p:nvPr>
+            <p:ph type="sldNum" sz="quarter" idx="12"/>
+          </p:nvPr>
+        </p:nvSpPr>
+        <p:spPr/>
+        <p:txBody>
+          <a:bodyPr/>
+          <a:lstStyle/>
+          <a:p>
+            <a:fld id="{A49DFD55-3C28-40EF-9E31-A92D2E4017FF}" type="slidenum">
+              <a:rPr lang="en-US" smtClean="0"/>
+              <a:pPr/>
+              <a:t>4</a:t>
+            </a:fld>
+            <a:endParaRPr lang="en-US" dirty="0"/>
+          </a:p>
+        </p:txBody>
+      </p:sp>
     </p:spTree>
     <p:extLst>
       <p:ext uri="{BB962C8B-B14F-4D97-AF65-F5344CB8AC3E}">
@@ -14681,6 +15285,36 @@
               <a:rPr lang="en-US" dirty="0"/>
               <a:t>Motivation</a:t>
             </a:r>
+          </a:p>
+        </p:txBody>
+      </p:sp>
+      <p:sp>
+        <p:nvSpPr>
+          <p:cNvPr id="2" name="Slide Number Placeholder 1">
+            <a:extLst>
+              <a:ext uri="{FF2B5EF4-FFF2-40B4-BE49-F238E27FC236}">
+                <a16:creationId xmlns:a16="http://schemas.microsoft.com/office/drawing/2014/main" id="{093DFCEC-BAD4-775C-7F2B-32EC52D2FEEC}"/>
+              </a:ext>
+            </a:extLst>
+          </p:cNvPr>
+          <p:cNvSpPr>
+            <a:spLocks noGrp="1"/>
+          </p:cNvSpPr>
+          <p:nvPr>
+            <p:ph type="sldNum" sz="quarter" idx="12"/>
+          </p:nvPr>
+        </p:nvSpPr>
+        <p:spPr/>
+        <p:txBody>
+          <a:bodyPr/>
+          <a:lstStyle/>
+          <a:p>
+            <a:fld id="{A49DFD55-3C28-40EF-9E31-A92D2E4017FF}" type="slidenum">
+              <a:rPr lang="en-US" smtClean="0"/>
+              <a:pPr/>
+              <a:t>5</a:t>
+            </a:fld>
+            <a:endParaRPr lang="en-US" dirty="0"/>
           </a:p>
         </p:txBody>
       </p:sp>
@@ -15791,6 +16425,36 @@
           </a:p>
         </p:txBody>
       </p:sp>
+      <p:sp>
+        <p:nvSpPr>
+          <p:cNvPr id="8" name="Slide Number Placeholder 7">
+            <a:extLst>
+              <a:ext uri="{FF2B5EF4-FFF2-40B4-BE49-F238E27FC236}">
+                <a16:creationId xmlns:a16="http://schemas.microsoft.com/office/drawing/2014/main" id="{953AEA4C-93D4-EB06-B1D8-626870043821}"/>
+              </a:ext>
+            </a:extLst>
+          </p:cNvPr>
+          <p:cNvSpPr>
+            <a:spLocks noGrp="1"/>
+          </p:cNvSpPr>
+          <p:nvPr>
+            <p:ph type="sldNum" sz="quarter" idx="12"/>
+          </p:nvPr>
+        </p:nvSpPr>
+        <p:spPr/>
+        <p:txBody>
+          <a:bodyPr/>
+          <a:lstStyle/>
+          <a:p>
+            <a:fld id="{A49DFD55-3C28-40EF-9E31-A92D2E4017FF}" type="slidenum">
+              <a:rPr lang="en-US" smtClean="0"/>
+              <a:pPr/>
+              <a:t>7</a:t>
+            </a:fld>
+            <a:endParaRPr lang="en-US" dirty="0"/>
+          </a:p>
+        </p:txBody>
+      </p:sp>
     </p:spTree>
     <p:extLst>
       <p:ext uri="{BB962C8B-B14F-4D97-AF65-F5344CB8AC3E}">
@@ -15999,6 +16663,36 @@
           </a:p>
         </p:txBody>
       </p:sp>
+      <p:sp>
+        <p:nvSpPr>
+          <p:cNvPr id="4" name="Slide Number Placeholder 3">
+            <a:extLst>
+              <a:ext uri="{FF2B5EF4-FFF2-40B4-BE49-F238E27FC236}">
+                <a16:creationId xmlns:a16="http://schemas.microsoft.com/office/drawing/2014/main" id="{7467D254-C863-1F20-A9E1-975B030120D1}"/>
+              </a:ext>
+            </a:extLst>
+          </p:cNvPr>
+          <p:cNvSpPr>
+            <a:spLocks noGrp="1"/>
+          </p:cNvSpPr>
+          <p:nvPr>
+            <p:ph type="sldNum" sz="quarter" idx="12"/>
+          </p:nvPr>
+        </p:nvSpPr>
+        <p:spPr/>
+        <p:txBody>
+          <a:bodyPr/>
+          <a:lstStyle/>
+          <a:p>
+            <a:fld id="{A49DFD55-3C28-40EF-9E31-A92D2E4017FF}" type="slidenum">
+              <a:rPr lang="en-US" smtClean="0"/>
+              <a:pPr/>
+              <a:t>8</a:t>
+            </a:fld>
+            <a:endParaRPr lang="en-US" dirty="0"/>
+          </a:p>
+        </p:txBody>
+      </p:sp>
     </p:spTree>
     <p:extLst>
       <p:ext uri="{BB962C8B-B14F-4D97-AF65-F5344CB8AC3E}">
@@ -16152,6 +16846,36 @@
               <a:rPr lang="en-US" dirty="0"/>
               <a:t>Deep Learning for Portfolio Optimization</a:t>
             </a:r>
+          </a:p>
+        </p:txBody>
+      </p:sp>
+      <p:sp>
+        <p:nvSpPr>
+          <p:cNvPr id="3" name="Slide Number Placeholder 2">
+            <a:extLst>
+              <a:ext uri="{FF2B5EF4-FFF2-40B4-BE49-F238E27FC236}">
+                <a16:creationId xmlns:a16="http://schemas.microsoft.com/office/drawing/2014/main" id="{B3604E8C-4323-9E3B-33F5-8A40659A9835}"/>
+              </a:ext>
+            </a:extLst>
+          </p:cNvPr>
+          <p:cNvSpPr>
+            <a:spLocks noGrp="1"/>
+          </p:cNvSpPr>
+          <p:nvPr>
+            <p:ph type="sldNum" sz="quarter" idx="12"/>
+          </p:nvPr>
+        </p:nvSpPr>
+        <p:spPr/>
+        <p:txBody>
+          <a:bodyPr/>
+          <a:lstStyle/>
+          <a:p>
+            <a:fld id="{A49DFD55-3C28-40EF-9E31-A92D2E4017FF}" type="slidenum">
+              <a:rPr lang="en-US" smtClean="0"/>
+              <a:pPr/>
+              <a:t>9</a:t>
+            </a:fld>
+            <a:endParaRPr lang="en-US" dirty="0"/>
           </a:p>
         </p:txBody>
       </p:sp>
@@ -16980,15 +17704,6 @@
 </file>
 
 <file path=customXml/item2.xml><?xml version="1.0" encoding="utf-8"?>
-<?mso-contentType ?>
-<FormTemplates xmlns="http://schemas.microsoft.com/sharepoint/v3/contenttype/forms">
-  <Display>DocumentLibraryForm</Display>
-  <Edit>DocumentLibraryForm</Edit>
-  <New>DocumentLibraryForm</New>
-</FormTemplates>
-</file>
-
-<file path=customXml/item3.xml><?xml version="1.0" encoding="utf-8"?>
 <ct:contentTypeSchema xmlns:ct="http://schemas.microsoft.com/office/2006/metadata/contentType" xmlns:ma="http://schemas.microsoft.com/office/2006/metadata/properties/metaAttributes" ct:_="" ma:_="" ma:contentTypeName="Document" ma:contentTypeID="0x01010079F111ED35F8CC479449609E8A0923A6" ma:contentTypeVersion="28" ma:contentTypeDescription="Create a new document." ma:contentTypeScope="" ma:versionID="60f5a4f2d2b0abadcf532d48ebf9cb71">
   <xsd:schema xmlns:xsd="http://www.w3.org/2001/XMLSchema" xmlns:xs="http://www.w3.org/2001/XMLSchema" xmlns:p="http://schemas.microsoft.com/office/2006/metadata/properties" xmlns:ns1="http://schemas.microsoft.com/sharepoint/v3" xmlns:ns2="71af3243-3dd4-4a8d-8c0d-dd76da1f02a5" xmlns:ns3="16c05727-aa75-4e4a-9b5f-8a80a1165891" xmlns:ns4="230e9df3-be65-4c73-a93b-d1236ebd677e" targetNamespace="http://schemas.microsoft.com/office/2006/metadata/properties" ma:root="true" ma:fieldsID="7dd78129e6a1811f84807ad11c651531" ns1:_="" ns2:_="" ns3:_="" ns4:_="">
     <xsd:import namespace="http://schemas.microsoft.com/sharepoint/v3"/>
@@ -17300,6 +18015,15 @@
 </ct:contentTypeSchema>
 </file>
 
+<file path=customXml/item3.xml><?xml version="1.0" encoding="utf-8"?>
+<?mso-contentType ?>
+<FormTemplates xmlns="http://schemas.microsoft.com/sharepoint/v3/contenttype/forms">
+  <Display>DocumentLibraryForm</Display>
+  <Edit>DocumentLibraryForm</Edit>
+  <New>DocumentLibraryForm</New>
+</FormTemplates>
+</file>
+
 <file path=customXml/itemProps1.xml><?xml version="1.0" encoding="utf-8"?>
 <ds:datastoreItem xmlns:ds="http://schemas.openxmlformats.org/officeDocument/2006/customXml" ds:itemID="{4CC7F809-A434-4A8D-A127-1C50C2DB3890}">
   <ds:schemaRefs>
@@ -17313,14 +18037,6 @@
 </file>
 
 <file path=customXml/itemProps2.xml><?xml version="1.0" encoding="utf-8"?>
-<ds:datastoreItem xmlns:ds="http://schemas.openxmlformats.org/officeDocument/2006/customXml" ds:itemID="{BD5826B4-4DD2-4A9B-8D6D-E91CF9C2316C}">
-  <ds:schemaRefs>
-    <ds:schemaRef ds:uri="http://schemas.microsoft.com/sharepoint/v3/contenttype/forms"/>
-  </ds:schemaRefs>
-</ds:datastoreItem>
-</file>
-
-<file path=customXml/itemProps3.xml><?xml version="1.0" encoding="utf-8"?>
 <ds:datastoreItem xmlns:ds="http://schemas.openxmlformats.org/officeDocument/2006/customXml" ds:itemID="{00E6EE1E-660B-46C6-AC21-8E505FB9574F}">
   <ds:schemaRefs>
     <ds:schemaRef ds:uri="http://schemas.microsoft.com/office/2006/metadata/contentType"/>
@@ -17341,6 +18057,14 @@
 </ds:datastoreItem>
 </file>
 
+<file path=customXml/itemProps3.xml><?xml version="1.0" encoding="utf-8"?>
+<ds:datastoreItem xmlns:ds="http://schemas.openxmlformats.org/officeDocument/2006/customXml" ds:itemID="{BD5826B4-4DD2-4A9B-8D6D-E91CF9C2316C}">
+  <ds:schemaRefs>
+    <ds:schemaRef ds:uri="http://schemas.microsoft.com/sharepoint/v3/contenttype/forms"/>
+  </ds:schemaRefs>
+</ds:datastoreItem>
+</file>
+
 <file path=docMetadata/LabelInfo.xml><?xml version="1.0" encoding="utf-8"?>
 <clbl:labelList xmlns:clbl="http://schemas.microsoft.com/office/2020/mipLabelMetadata"/>
 </file>
</xml_diff>